<commit_message>
add contry lat lon
</commit_message>
<xml_diff>
--- a/presentacion/PresenacionIdeasPrincipales.pptx
+++ b/presentacion/PresenacionIdeasPrincipales.pptx
@@ -5,9 +5,9 @@
     <p:sldMasterId id="2147483648" r:id="rId1"/>
   </p:sldMasterIdLst>
   <p:sldIdLst>
-    <p:sldId id="257" r:id="rId2"/>
-    <p:sldId id="258" r:id="rId3"/>
-    <p:sldId id="256" r:id="rId4"/>
+    <p:sldId id="256" r:id="rId2"/>
+    <p:sldId id="257" r:id="rId3"/>
+    <p:sldId id="258" r:id="rId4"/>
   </p:sldIdLst>
   <p:sldSz cx="12192000" cy="6858000"/>
   <p:notesSz cx="6858000" cy="9144000"/>
@@ -106,6 +106,11 @@
       </a:defRPr>
     </a:lvl9pPr>
   </p:defaultTextStyle>
+  <p:extLst>
+    <p:ext uri="{EFAFB233-063F-42B5-8137-9DF3F51BA10A}">
+      <p15:sldGuideLst xmlns:p15="http://schemas.microsoft.com/office/powerpoint/2012/main"/>
+    </p:ext>
+  </p:extLst>
 </p:presentation>
 </file>
 
@@ -258,7 +263,7 @@
           <a:p>
             <a:fld id="{BF7C8B78-4CE7-4745-B714-B3D74CE75516}" type="datetimeFigureOut">
               <a:rPr lang="es-PE" smtClean="0"/>
-              <a:t>18/11/2022</a:t>
+              <a:t>24/11/2022</a:t>
             </a:fld>
             <a:endParaRPr lang="es-PE"/>
           </a:p>
@@ -458,7 +463,7 @@
           <a:p>
             <a:fld id="{BF7C8B78-4CE7-4745-B714-B3D74CE75516}" type="datetimeFigureOut">
               <a:rPr lang="es-PE" smtClean="0"/>
-              <a:t>18/11/2022</a:t>
+              <a:t>24/11/2022</a:t>
             </a:fld>
             <a:endParaRPr lang="es-PE"/>
           </a:p>
@@ -668,7 +673,7 @@
           <a:p>
             <a:fld id="{BF7C8B78-4CE7-4745-B714-B3D74CE75516}" type="datetimeFigureOut">
               <a:rPr lang="es-PE" smtClean="0"/>
-              <a:t>18/11/2022</a:t>
+              <a:t>24/11/2022</a:t>
             </a:fld>
             <a:endParaRPr lang="es-PE"/>
           </a:p>
@@ -868,7 +873,7 @@
           <a:p>
             <a:fld id="{BF7C8B78-4CE7-4745-B714-B3D74CE75516}" type="datetimeFigureOut">
               <a:rPr lang="es-PE" smtClean="0"/>
-              <a:t>18/11/2022</a:t>
+              <a:t>24/11/2022</a:t>
             </a:fld>
             <a:endParaRPr lang="es-PE"/>
           </a:p>
@@ -1144,7 +1149,7 @@
           <a:p>
             <a:fld id="{BF7C8B78-4CE7-4745-B714-B3D74CE75516}" type="datetimeFigureOut">
               <a:rPr lang="es-PE" smtClean="0"/>
-              <a:t>18/11/2022</a:t>
+              <a:t>24/11/2022</a:t>
             </a:fld>
             <a:endParaRPr lang="es-PE"/>
           </a:p>
@@ -1412,7 +1417,7 @@
           <a:p>
             <a:fld id="{BF7C8B78-4CE7-4745-B714-B3D74CE75516}" type="datetimeFigureOut">
               <a:rPr lang="es-PE" smtClean="0"/>
-              <a:t>18/11/2022</a:t>
+              <a:t>24/11/2022</a:t>
             </a:fld>
             <a:endParaRPr lang="es-PE"/>
           </a:p>
@@ -1827,7 +1832,7 @@
           <a:p>
             <a:fld id="{BF7C8B78-4CE7-4745-B714-B3D74CE75516}" type="datetimeFigureOut">
               <a:rPr lang="es-PE" smtClean="0"/>
-              <a:t>18/11/2022</a:t>
+              <a:t>24/11/2022</a:t>
             </a:fld>
             <a:endParaRPr lang="es-PE"/>
           </a:p>
@@ -1969,7 +1974,7 @@
           <a:p>
             <a:fld id="{BF7C8B78-4CE7-4745-B714-B3D74CE75516}" type="datetimeFigureOut">
               <a:rPr lang="es-PE" smtClean="0"/>
-              <a:t>18/11/2022</a:t>
+              <a:t>24/11/2022</a:t>
             </a:fld>
             <a:endParaRPr lang="es-PE"/>
           </a:p>
@@ -2082,7 +2087,7 @@
           <a:p>
             <a:fld id="{BF7C8B78-4CE7-4745-B714-B3D74CE75516}" type="datetimeFigureOut">
               <a:rPr lang="es-PE" smtClean="0"/>
-              <a:t>18/11/2022</a:t>
+              <a:t>24/11/2022</a:t>
             </a:fld>
             <a:endParaRPr lang="es-PE"/>
           </a:p>
@@ -2395,7 +2400,7 @@
           <a:p>
             <a:fld id="{BF7C8B78-4CE7-4745-B714-B3D74CE75516}" type="datetimeFigureOut">
               <a:rPr lang="es-PE" smtClean="0"/>
-              <a:t>18/11/2022</a:t>
+              <a:t>24/11/2022</a:t>
             </a:fld>
             <a:endParaRPr lang="es-PE"/>
           </a:p>
@@ -2684,7 +2689,7 @@
           <a:p>
             <a:fld id="{BF7C8B78-4CE7-4745-B714-B3D74CE75516}" type="datetimeFigureOut">
               <a:rPr lang="es-PE" smtClean="0"/>
-              <a:t>18/11/2022</a:t>
+              <a:t>24/11/2022</a:t>
             </a:fld>
             <a:endParaRPr lang="es-PE"/>
           </a:p>
@@ -2927,7 +2932,7 @@
           <a:p>
             <a:fld id="{BF7C8B78-4CE7-4745-B714-B3D74CE75516}" type="datetimeFigureOut">
               <a:rPr lang="es-PE" smtClean="0"/>
-              <a:t>18/11/2022</a:t>
+              <a:t>24/11/2022</a:t>
             </a:fld>
             <a:endParaRPr lang="es-PE"/>
           </a:p>
@@ -3396,6 +3401,53 @@
           </a:p>
         </p:txBody>
       </p:sp>
+      <p:pic>
+        <p:nvPicPr>
+          <p:cNvPr id="1026" name="Picture 2" descr="España sigue a la cola de Europa en el Índice de la Percepción de la  Corrupción - Revista Haz">
+            <a:extLst>
+              <a:ext uri="{FF2B5EF4-FFF2-40B4-BE49-F238E27FC236}">
+                <a16:creationId xmlns:a16="http://schemas.microsoft.com/office/drawing/2014/main" id="{C8581924-D8B5-11A8-54E4-81C984ECDC34}"/>
+              </a:ext>
+            </a:extLst>
+          </p:cNvPr>
+          <p:cNvPicPr>
+            <a:picLocks noChangeAspect="1" noChangeArrowheads="1"/>
+          </p:cNvPicPr>
+          <p:nvPr/>
+        </p:nvPicPr>
+        <p:blipFill>
+          <a:blip r:embed="rId2">
+            <a:extLst>
+              <a:ext uri="{28A0092B-C50C-407E-A947-70E740481C1C}">
+                <a14:useLocalDpi xmlns:a14="http://schemas.microsoft.com/office/drawing/2010/main" val="0"/>
+              </a:ext>
+            </a:extLst>
+          </a:blip>
+          <a:srcRect/>
+          <a:stretch>
+            <a:fillRect/>
+          </a:stretch>
+        </p:blipFill>
+        <p:spPr bwMode="auto">
+          <a:xfrm>
+            <a:off x="265043" y="1656521"/>
+            <a:ext cx="8572500" cy="4857407"/>
+          </a:xfrm>
+          <a:prstGeom prst="rect">
+            <a:avLst/>
+          </a:prstGeom>
+          <a:noFill/>
+          <a:extLst>
+            <a:ext uri="{909E8E84-426E-40DD-AFC4-6F175D3DCCD1}">
+              <a14:hiddenFill xmlns:a14="http://schemas.microsoft.com/office/drawing/2010/main">
+                <a:solidFill>
+                  <a:srgbClr val="FFFFFF"/>
+                </a:solidFill>
+              </a14:hiddenFill>
+            </a:ext>
+          </a:extLst>
+        </p:spPr>
+      </p:pic>
       <p:sp>
         <p:nvSpPr>
           <p:cNvPr id="3" name="Subtítulo 2">
@@ -3436,7 +3488,7 @@
           <a:p>
             <a:r>
               <a:rPr lang="es-PE" dirty="0"/>
-              <a:t>GRAFICO de Barras</a:t>
+              <a:t>GRAFICO</a:t>
             </a:r>
           </a:p>
         </p:txBody>
@@ -3456,7 +3508,7 @@
         <p:spPr>
           <a:xfrm>
             <a:off x="543339" y="294554"/>
-            <a:ext cx="5330411" cy="369332"/>
+            <a:ext cx="4909625" cy="369332"/>
           </a:xfrm>
           <a:prstGeom prst="rect">
             <a:avLst/>
@@ -3471,13 +3523,8 @@
           <a:p>
             <a:r>
               <a:rPr lang="es-PE" dirty="0"/>
-              <a:t>Principales Países con corrupción en </a:t>
-            </a:r>
-            <a:r>
-              <a:rPr lang="es-PE" dirty="0" err="1"/>
-              <a:t>europa</a:t>
-            </a:r>
-            <a:endParaRPr lang="es-PE" dirty="0"/>
+              <a:t>Índice de Corrupción en los países de Europa</a:t>
+            </a:r>
           </a:p>
         </p:txBody>
       </p:sp>
@@ -3495,8 +3542,8 @@
         </p:nvSpPr>
         <p:spPr>
           <a:xfrm>
-            <a:off x="8940018" y="1381538"/>
-            <a:ext cx="2986939" cy="1754326"/>
+            <a:off x="9115837" y="1150008"/>
+            <a:ext cx="2986939" cy="5078313"/>
           </a:xfrm>
           <a:prstGeom prst="rect">
             <a:avLst/>
@@ -3552,6 +3599,67 @@
             <a:r>
               <a:rPr lang="es-PE" dirty="0"/>
               <a:t>C</a:t>
+            </a:r>
+          </a:p>
+          <a:p>
+            <a:pPr marL="742950" lvl="1" indent="-285750">
+              <a:buFontTx/>
+              <a:buChar char="-"/>
+            </a:pPr>
+            <a:endParaRPr lang="es-PE" dirty="0"/>
+          </a:p>
+          <a:p>
+            <a:pPr marL="742950" lvl="1" indent="-285750">
+              <a:buFontTx/>
+              <a:buChar char="-"/>
+            </a:pPr>
+            <a:endParaRPr lang="es-PE" dirty="0"/>
+          </a:p>
+          <a:p>
+            <a:pPr marL="742950" lvl="1" indent="-285750">
+              <a:buFontTx/>
+              <a:buChar char="-"/>
+            </a:pPr>
+            <a:r>
+              <a:rPr lang="es-PE" dirty="0"/>
+              <a:t>Grafico Adicional</a:t>
+            </a:r>
+          </a:p>
+          <a:p>
+            <a:pPr marL="742950" lvl="1" indent="-285750">
+              <a:buFontTx/>
+              <a:buChar char="-"/>
+            </a:pPr>
+            <a:r>
+              <a:rPr lang="es-PE" dirty="0"/>
+              <a:t>Grafico estático con aspectos de Croacia, PBI otras variables socioeconómicas</a:t>
+            </a:r>
+          </a:p>
+          <a:p>
+            <a:pPr marL="742950" lvl="1" indent="-285750">
+              <a:buFontTx/>
+              <a:buChar char="-"/>
+            </a:pPr>
+            <a:r>
+              <a:rPr lang="es-PE" dirty="0"/>
+              <a:t>Comparación</a:t>
+            </a:r>
+          </a:p>
+          <a:p>
+            <a:pPr marL="742950" lvl="1" indent="-285750">
+              <a:buFontTx/>
+              <a:buChar char="-"/>
+            </a:pPr>
+            <a:endParaRPr lang="es-PE" dirty="0"/>
+          </a:p>
+          <a:p>
+            <a:pPr marL="742950" lvl="1" indent="-285750">
+              <a:buFontTx/>
+              <a:buChar char="-"/>
+            </a:pPr>
+            <a:r>
+              <a:rPr lang="es-PE" dirty="0"/>
+              <a:t>País mas corrupto en cada continente grafico de barra</a:t>
             </a:r>
           </a:p>
         </p:txBody>
@@ -3610,10 +3718,10 @@
       </p:sp>
       <p:sp>
         <p:nvSpPr>
-          <p:cNvPr id="2" name="Rectángulo 1">
-            <a:extLst>
-              <a:ext uri="{FF2B5EF4-FFF2-40B4-BE49-F238E27FC236}">
-                <a16:creationId xmlns:a16="http://schemas.microsoft.com/office/drawing/2014/main" id="{224D68ED-C2DD-DE99-F6A8-AADD23519BFB}"/>
+          <p:cNvPr id="8" name="Rectángulo 7">
+            <a:extLst>
+              <a:ext uri="{FF2B5EF4-FFF2-40B4-BE49-F238E27FC236}">
+                <a16:creationId xmlns:a16="http://schemas.microsoft.com/office/drawing/2014/main" id="{AB80D4B9-0892-E940-DA12-95709D3C065E}"/>
               </a:ext>
             </a:extLst>
           </p:cNvPr>
@@ -3622,8 +3730,8 @@
         </p:nvSpPr>
         <p:spPr>
           <a:xfrm>
-            <a:off x="543339" y="1266799"/>
-            <a:ext cx="7460974" cy="4754171"/>
+            <a:off x="543338" y="1266799"/>
+            <a:ext cx="8413677" cy="4754171"/>
           </a:xfrm>
           <a:prstGeom prst="rect">
             <a:avLst/>
@@ -3655,10 +3763,45 @@
           </a:p>
         </p:txBody>
       </p:sp>
+      <p:sp>
+        <p:nvSpPr>
+          <p:cNvPr id="9" name="CuadroTexto 8">
+            <a:extLst>
+              <a:ext uri="{FF2B5EF4-FFF2-40B4-BE49-F238E27FC236}">
+                <a16:creationId xmlns:a16="http://schemas.microsoft.com/office/drawing/2014/main" id="{09980866-C5D5-3F72-D935-EC9120C88687}"/>
+              </a:ext>
+            </a:extLst>
+          </p:cNvPr>
+          <p:cNvSpPr txBox="1"/>
+          <p:nvPr/>
+        </p:nvSpPr>
+        <p:spPr>
+          <a:xfrm>
+            <a:off x="569320" y="780676"/>
+            <a:ext cx="8268223" cy="369332"/>
+          </a:xfrm>
+          <a:prstGeom prst="rect">
+            <a:avLst/>
+          </a:prstGeom>
+          <a:noFill/>
+        </p:spPr>
+        <p:txBody>
+          <a:bodyPr wrap="square" rtlCol="0">
+            <a:spAutoFit/>
+          </a:bodyPr>
+          <a:lstStyle/>
+          <a:p>
+            <a:r>
+              <a:rPr lang="es-PE" dirty="0"/>
+              <a:t>https://github.com/datasets/corruption-perceptions-index/blob/master/data/cpi.csv</a:t>
+            </a:r>
+          </a:p>
+        </p:txBody>
+      </p:sp>
     </p:spTree>
     <p:extLst>
       <p:ext uri="{BB962C8B-B14F-4D97-AF65-F5344CB8AC3E}">
-        <p14:creationId xmlns:p14="http://schemas.microsoft.com/office/powerpoint/2010/main" val="3173449278"/>
+        <p14:creationId xmlns:p14="http://schemas.microsoft.com/office/powerpoint/2010/main" val="2317272618"/>
       </p:ext>
     </p:extLst>
   </p:cSld>
@@ -3777,7 +3920,7 @@
           <a:p>
             <a:r>
               <a:rPr lang="es-PE" dirty="0"/>
-              <a:t>GRAFICO Animado</a:t>
+              <a:t>GRAFICO de Barras</a:t>
             </a:r>
           </a:p>
         </p:txBody>
@@ -3797,7 +3940,7 @@
         <p:spPr>
           <a:xfrm>
             <a:off x="543339" y="294554"/>
-            <a:ext cx="5330411" cy="646331"/>
+            <a:ext cx="5330411" cy="369332"/>
           </a:xfrm>
           <a:prstGeom prst="rect">
             <a:avLst/>
@@ -3812,8 +3955,13 @@
           <a:p>
             <a:r>
               <a:rPr lang="es-PE" dirty="0"/>
-              <a:t>Crecimiento de la Corrupción en los últimos 5 años en los países de Europa</a:t>
-            </a:r>
+              <a:t>Principales Países con corrupción en </a:t>
+            </a:r>
+            <a:r>
+              <a:rPr lang="es-PE" dirty="0" err="1"/>
+              <a:t>europa</a:t>
+            </a:r>
+            <a:endParaRPr lang="es-PE" dirty="0"/>
           </a:p>
         </p:txBody>
       </p:sp>
@@ -3949,7 +4097,7 @@
           <p:cNvPr id="2" name="Rectángulo 1">
             <a:extLst>
               <a:ext uri="{FF2B5EF4-FFF2-40B4-BE49-F238E27FC236}">
-                <a16:creationId xmlns:a16="http://schemas.microsoft.com/office/drawing/2014/main" id="{F9101003-1F65-1DA8-6251-36357813F24A}"/>
+                <a16:creationId xmlns:a16="http://schemas.microsoft.com/office/drawing/2014/main" id="{224D68ED-C2DD-DE99-F6A8-AADD23519BFB}"/>
               </a:ext>
             </a:extLst>
           </p:cNvPr>
@@ -3994,7 +4142,7 @@
     </p:spTree>
     <p:extLst>
       <p:ext uri="{BB962C8B-B14F-4D97-AF65-F5344CB8AC3E}">
-        <p14:creationId xmlns:p14="http://schemas.microsoft.com/office/powerpoint/2010/main" val="3231656937"/>
+        <p14:creationId xmlns:p14="http://schemas.microsoft.com/office/powerpoint/2010/main" val="3173449278"/>
       </p:ext>
     </p:extLst>
   </p:cSld>
@@ -4073,53 +4221,6 @@
           </a:p>
         </p:txBody>
       </p:sp>
-      <p:pic>
-        <p:nvPicPr>
-          <p:cNvPr id="1026" name="Picture 2" descr="España sigue a la cola de Europa en el Índice de la Percepción de la  Corrupción - Revista Haz">
-            <a:extLst>
-              <a:ext uri="{FF2B5EF4-FFF2-40B4-BE49-F238E27FC236}">
-                <a16:creationId xmlns:a16="http://schemas.microsoft.com/office/drawing/2014/main" id="{C8581924-D8B5-11A8-54E4-81C984ECDC34}"/>
-              </a:ext>
-            </a:extLst>
-          </p:cNvPr>
-          <p:cNvPicPr>
-            <a:picLocks noChangeAspect="1" noChangeArrowheads="1"/>
-          </p:cNvPicPr>
-          <p:nvPr/>
-        </p:nvPicPr>
-        <p:blipFill>
-          <a:blip r:embed="rId2">
-            <a:extLst>
-              <a:ext uri="{28A0092B-C50C-407E-A947-70E740481C1C}">
-                <a14:useLocalDpi xmlns:a14="http://schemas.microsoft.com/office/drawing/2010/main" val="0"/>
-              </a:ext>
-            </a:extLst>
-          </a:blip>
-          <a:srcRect/>
-          <a:stretch>
-            <a:fillRect/>
-          </a:stretch>
-        </p:blipFill>
-        <p:spPr bwMode="auto">
-          <a:xfrm>
-            <a:off x="265043" y="1656521"/>
-            <a:ext cx="8572500" cy="4857407"/>
-          </a:xfrm>
-          <a:prstGeom prst="rect">
-            <a:avLst/>
-          </a:prstGeom>
-          <a:noFill/>
-          <a:extLst>
-            <a:ext uri="{909E8E84-426E-40DD-AFC4-6F175D3DCCD1}">
-              <a14:hiddenFill xmlns:a14="http://schemas.microsoft.com/office/drawing/2010/main">
-                <a:solidFill>
-                  <a:srgbClr val="FFFFFF"/>
-                </a:solidFill>
-              </a14:hiddenFill>
-            </a:ext>
-          </a:extLst>
-        </p:spPr>
-      </p:pic>
       <p:sp>
         <p:nvSpPr>
           <p:cNvPr id="3" name="Subtítulo 2">
@@ -4160,7 +4261,7 @@
           <a:p>
             <a:r>
               <a:rPr lang="es-PE" dirty="0"/>
-              <a:t>GRAFICO</a:t>
+              <a:t>GRAFICO Animado</a:t>
             </a:r>
           </a:p>
         </p:txBody>
@@ -4180,7 +4281,7 @@
         <p:spPr>
           <a:xfrm>
             <a:off x="543339" y="294554"/>
-            <a:ext cx="4909625" cy="369332"/>
+            <a:ext cx="5330411" cy="646331"/>
           </a:xfrm>
           <a:prstGeom prst="rect">
             <a:avLst/>
@@ -4195,7 +4296,7 @@
           <a:p>
             <a:r>
               <a:rPr lang="es-PE" dirty="0"/>
-              <a:t>Índice de Corrupción en los países de Europa</a:t>
+              <a:t>Crecimiento de la Corrupción en los últimos 5 años en los países de Europa</a:t>
             </a:r>
           </a:p>
         </p:txBody>
@@ -4214,8 +4315,8 @@
         </p:nvSpPr>
         <p:spPr>
           <a:xfrm>
-            <a:off x="9115837" y="1150008"/>
-            <a:ext cx="2986939" cy="5078313"/>
+            <a:off x="8940018" y="1381538"/>
+            <a:ext cx="2986939" cy="1754326"/>
           </a:xfrm>
           <a:prstGeom prst="rect">
             <a:avLst/>
@@ -4271,67 +4372,6 @@
             <a:r>
               <a:rPr lang="es-PE" dirty="0"/>
               <a:t>C</a:t>
-            </a:r>
-          </a:p>
-          <a:p>
-            <a:pPr marL="742950" lvl="1" indent="-285750">
-              <a:buFontTx/>
-              <a:buChar char="-"/>
-            </a:pPr>
-            <a:endParaRPr lang="es-PE" dirty="0"/>
-          </a:p>
-          <a:p>
-            <a:pPr marL="742950" lvl="1" indent="-285750">
-              <a:buFontTx/>
-              <a:buChar char="-"/>
-            </a:pPr>
-            <a:endParaRPr lang="es-PE" dirty="0"/>
-          </a:p>
-          <a:p>
-            <a:pPr marL="742950" lvl="1" indent="-285750">
-              <a:buFontTx/>
-              <a:buChar char="-"/>
-            </a:pPr>
-            <a:r>
-              <a:rPr lang="es-PE" dirty="0"/>
-              <a:t>Grafico Adicional</a:t>
-            </a:r>
-          </a:p>
-          <a:p>
-            <a:pPr marL="742950" lvl="1" indent="-285750">
-              <a:buFontTx/>
-              <a:buChar char="-"/>
-            </a:pPr>
-            <a:r>
-              <a:rPr lang="es-PE" dirty="0"/>
-              <a:t>Grafico estático con aspectos de Croacia, PBI otras variables socioeconómicas</a:t>
-            </a:r>
-          </a:p>
-          <a:p>
-            <a:pPr marL="742950" lvl="1" indent="-285750">
-              <a:buFontTx/>
-              <a:buChar char="-"/>
-            </a:pPr>
-            <a:r>
-              <a:rPr lang="es-PE" dirty="0"/>
-              <a:t>Comparación</a:t>
-            </a:r>
-          </a:p>
-          <a:p>
-            <a:pPr marL="742950" lvl="1" indent="-285750">
-              <a:buFontTx/>
-              <a:buChar char="-"/>
-            </a:pPr>
-            <a:endParaRPr lang="es-PE" dirty="0"/>
-          </a:p>
-          <a:p>
-            <a:pPr marL="742950" lvl="1" indent="-285750">
-              <a:buFontTx/>
-              <a:buChar char="-"/>
-            </a:pPr>
-            <a:r>
-              <a:rPr lang="es-PE" dirty="0"/>
-              <a:t>País mas corrupto en cada continente grafico de barra</a:t>
             </a:r>
           </a:p>
         </p:txBody>
@@ -4390,10 +4430,10 @@
       </p:sp>
       <p:sp>
         <p:nvSpPr>
-          <p:cNvPr id="8" name="Rectángulo 7">
-            <a:extLst>
-              <a:ext uri="{FF2B5EF4-FFF2-40B4-BE49-F238E27FC236}">
-                <a16:creationId xmlns:a16="http://schemas.microsoft.com/office/drawing/2014/main" id="{AB80D4B9-0892-E940-DA12-95709D3C065E}"/>
+          <p:cNvPr id="2" name="Rectángulo 1">
+            <a:extLst>
+              <a:ext uri="{FF2B5EF4-FFF2-40B4-BE49-F238E27FC236}">
+                <a16:creationId xmlns:a16="http://schemas.microsoft.com/office/drawing/2014/main" id="{F9101003-1F65-1DA8-6251-36357813F24A}"/>
               </a:ext>
             </a:extLst>
           </p:cNvPr>
@@ -4402,8 +4442,8 @@
         </p:nvSpPr>
         <p:spPr>
           <a:xfrm>
-            <a:off x="543338" y="1266799"/>
-            <a:ext cx="8413677" cy="4754171"/>
+            <a:off x="543339" y="1266799"/>
+            <a:ext cx="7460974" cy="4754171"/>
           </a:xfrm>
           <a:prstGeom prst="rect">
             <a:avLst/>
@@ -4435,45 +4475,10 @@
           </a:p>
         </p:txBody>
       </p:sp>
-      <p:sp>
-        <p:nvSpPr>
-          <p:cNvPr id="9" name="CuadroTexto 8">
-            <a:extLst>
-              <a:ext uri="{FF2B5EF4-FFF2-40B4-BE49-F238E27FC236}">
-                <a16:creationId xmlns:a16="http://schemas.microsoft.com/office/drawing/2014/main" id="{09980866-C5D5-3F72-D935-EC9120C88687}"/>
-              </a:ext>
-            </a:extLst>
-          </p:cNvPr>
-          <p:cNvSpPr txBox="1"/>
-          <p:nvPr/>
-        </p:nvSpPr>
-        <p:spPr>
-          <a:xfrm>
-            <a:off x="569320" y="780676"/>
-            <a:ext cx="8268223" cy="369332"/>
-          </a:xfrm>
-          <a:prstGeom prst="rect">
-            <a:avLst/>
-          </a:prstGeom>
-          <a:noFill/>
-        </p:spPr>
-        <p:txBody>
-          <a:bodyPr wrap="square" rtlCol="0">
-            <a:spAutoFit/>
-          </a:bodyPr>
-          <a:lstStyle/>
-          <a:p>
-            <a:r>
-              <a:rPr lang="es-PE" dirty="0"/>
-              <a:t>https://github.com/datasets/corruption-perceptions-index/blob/master/data/cpi.csv</a:t>
-            </a:r>
-          </a:p>
-        </p:txBody>
-      </p:sp>
     </p:spTree>
     <p:extLst>
       <p:ext uri="{BB962C8B-B14F-4D97-AF65-F5344CB8AC3E}">
-        <p14:creationId xmlns:p14="http://schemas.microsoft.com/office/powerpoint/2010/main" val="2317272618"/>
+        <p14:creationId xmlns:p14="http://schemas.microsoft.com/office/powerpoint/2010/main" val="3231656937"/>
       </p:ext>
     </p:extLst>
   </p:cSld>

</xml_diff>